<commit_message>
Add report and ppt
</commit_message>
<xml_diff>
--- a/Presentation-IoT-Ruche.pptx
+++ b/Presentation-IoT-Ruche.pptx
@@ -288,7 +288,7 @@
           <a:p>
             <a:fld id="{AC8CEC3D-96F7-401F-9673-3EE7F75C9C5B}" type="datetimeFigureOut">
               <a:rPr lang="fr-FR"/>
-              <a:t>10/01/2023</a:t>
+              <a:t>11/01/2023</a:t>
             </a:fld>
             <a:endParaRPr dirty="0"/>
           </a:p>
@@ -453,7 +453,7 @@
           <a:p>
             <a:fld id="{F032BCF4-D26D-4DAF-9F57-FE1E61FE7935}" type="datetimeFigureOut">
               <a:rPr lang="fr-FR"/>
-              <a:t>10/01/2023</a:t>
+              <a:t>11/01/2023</a:t>
             </a:fld>
             <a:endParaRPr dirty="0"/>
           </a:p>
@@ -1690,7 +1690,7 @@
           <a:p>
             <a:fld id="{52A50810-1B15-40E7-8CB0-1FC88B75EB6D}" type="datetime1">
               <a:rPr lang="fr-FR" smtClean="0"/>
-              <a:t>10/01/2023</a:t>
+              <a:t>11/01/2023</a:t>
             </a:fld>
             <a:endParaRPr dirty="0"/>
           </a:p>
@@ -1977,7 +1977,7 @@
           <a:p>
             <a:fld id="{CF6CB9C9-C268-47F1-A3AA-B69E1676814E}" type="datetime1">
               <a:rPr lang="fr-FR" smtClean="0"/>
-              <a:t>10/01/2023</a:t>
+              <a:t>11/01/2023</a:t>
             </a:fld>
             <a:endParaRPr dirty="0"/>
           </a:p>
@@ -2175,7 +2175,7 @@
           <a:p>
             <a:fld id="{A93D5AE3-88AA-4EBD-815F-A78BA2DFB679}" type="datetime1">
               <a:rPr lang="fr-FR" smtClean="0"/>
-              <a:t>10/01/2023</a:t>
+              <a:t>11/01/2023</a:t>
             </a:fld>
             <a:endParaRPr dirty="0"/>
           </a:p>
@@ -2383,7 +2383,7 @@
           <a:p>
             <a:fld id="{DD4B7E16-669C-484D-B7A6-41017C372E74}" type="datetime1">
               <a:rPr lang="fr-FR" smtClean="0"/>
-              <a:t>10/01/2023</a:t>
+              <a:t>11/01/2023</a:t>
             </a:fld>
             <a:endParaRPr dirty="0"/>
           </a:p>
@@ -2587,7 +2587,7 @@
           <a:p>
             <a:fld id="{49AAA0E5-118D-4ED4-B598-484C76A05263}" type="datetime1">
               <a:rPr lang="fr-FR" smtClean="0"/>
-              <a:t>10/01/2023</a:t>
+              <a:t>11/01/2023</a:t>
             </a:fld>
             <a:endParaRPr lang="fr-CH" dirty="0"/>
           </a:p>
@@ -2757,7 +2757,7 @@
           <a:p>
             <a:fld id="{E8593F77-75D5-41A7-83F7-39C5733D61A5}" type="datetime1">
               <a:rPr lang="fr-FR" smtClean="0"/>
-              <a:t>10/01/2023</a:t>
+              <a:t>11/01/2023</a:t>
             </a:fld>
             <a:endParaRPr lang="fr-CH" dirty="0"/>
           </a:p>
@@ -3003,7 +3003,7 @@
           <a:p>
             <a:fld id="{EA00142E-6EA6-47E0-816C-2F50C9992A6A}" type="datetime1">
               <a:rPr lang="fr-FR" smtClean="0"/>
-              <a:t>10/01/2023</a:t>
+              <a:t>11/01/2023</a:t>
             </a:fld>
             <a:endParaRPr lang="fr-CH" dirty="0"/>
           </a:p>
@@ -3235,7 +3235,7 @@
           <a:p>
             <a:fld id="{CDBB7212-5D6A-4716-8BFD-57538C553FCD}" type="datetime1">
               <a:rPr lang="fr-FR" smtClean="0"/>
-              <a:t>10/01/2023</a:t>
+              <a:t>11/01/2023</a:t>
             </a:fld>
             <a:endParaRPr lang="fr-CH" dirty="0"/>
           </a:p>
@@ -3602,7 +3602,7 @@
           <a:p>
             <a:fld id="{E82B2D81-D1AA-45AD-9F34-A72C63DC7014}" type="datetime1">
               <a:rPr lang="fr-FR" smtClean="0"/>
-              <a:t>10/01/2023</a:t>
+              <a:t>11/01/2023</a:t>
             </a:fld>
             <a:endParaRPr lang="fr-CH" dirty="0"/>
           </a:p>
@@ -3720,7 +3720,7 @@
           <a:p>
             <a:fld id="{45B5E7E0-D1E6-4BF5-A52D-CC723424A8EF}" type="datetime1">
               <a:rPr lang="fr-FR" smtClean="0"/>
-              <a:t>10/01/2023</a:t>
+              <a:t>11/01/2023</a:t>
             </a:fld>
             <a:endParaRPr lang="fr-CH" dirty="0"/>
           </a:p>
@@ -3815,7 +3815,7 @@
           <a:p>
             <a:fld id="{3BC4B559-381F-45D9-A416-505D678A2B97}" type="datetime1">
               <a:rPr lang="fr-FR" smtClean="0"/>
-              <a:t>10/01/2023</a:t>
+              <a:t>11/01/2023</a:t>
             </a:fld>
             <a:endParaRPr lang="fr-CH" dirty="0"/>
           </a:p>
@@ -3933,7 +3933,7 @@
           <a:p>
             <a:fld id="{69AEDF00-A549-4A8A-84AE-8122C536ED1E}" type="datetime1">
               <a:rPr lang="fr-FR" smtClean="0"/>
-              <a:t>10/01/2023</a:t>
+              <a:t>11/01/2023</a:t>
             </a:fld>
             <a:endParaRPr lang="fr-FR" dirty="0"/>
           </a:p>
@@ -4223,7 +4223,7 @@
           <a:p>
             <a:fld id="{C6098A9D-DD16-42BE-A584-842162255228}" type="datetime1">
               <a:rPr lang="fr-FR" smtClean="0"/>
-              <a:t>10/01/2023</a:t>
+              <a:t>11/01/2023</a:t>
             </a:fld>
             <a:endParaRPr lang="fr-CH" dirty="0"/>
           </a:p>
@@ -4476,7 +4476,7 @@
           <a:p>
             <a:fld id="{5754BE0C-A75F-4BB3-B510-85B262C4DA84}" type="datetime1">
               <a:rPr lang="fr-FR" smtClean="0"/>
-              <a:t>10/01/2023</a:t>
+              <a:t>11/01/2023</a:t>
             </a:fld>
             <a:endParaRPr lang="fr-CH" dirty="0"/>
           </a:p>
@@ -4646,7 +4646,7 @@
           <a:p>
             <a:fld id="{F1BAD680-4B24-4A99-9D8D-5141AB3DF606}" type="datetime1">
               <a:rPr lang="fr-FR" smtClean="0"/>
-              <a:t>10/01/2023</a:t>
+              <a:t>11/01/2023</a:t>
             </a:fld>
             <a:endParaRPr lang="fr-CH" dirty="0"/>
           </a:p>
@@ -4826,7 +4826,7 @@
           <a:p>
             <a:fld id="{4A485196-DC5F-4C93-BA97-8B2C371D3408}" type="datetime1">
               <a:rPr lang="fr-FR" smtClean="0"/>
-              <a:t>10/01/2023</a:t>
+              <a:t>11/01/2023</a:t>
             </a:fld>
             <a:endParaRPr lang="fr-CH" dirty="0"/>
           </a:p>
@@ -5018,7 +5018,7 @@
           <a:p>
             <a:fld id="{25A1D821-7820-40A6-8A7B-5DCC515E33A6}" type="datetime1">
               <a:rPr lang="fr-FR" smtClean="0"/>
-              <a:t>10/01/2023</a:t>
+              <a:t>11/01/2023</a:t>
             </a:fld>
             <a:endParaRPr lang="fr-CH" dirty="0"/>
           </a:p>
@@ -5188,7 +5188,7 @@
           <a:p>
             <a:fld id="{6D6253CD-BF65-465F-9AE6-D74537EA5A07}" type="datetime1">
               <a:rPr lang="fr-FR" smtClean="0"/>
-              <a:t>10/01/2023</a:t>
+              <a:t>11/01/2023</a:t>
             </a:fld>
             <a:endParaRPr lang="fr-CH" dirty="0"/>
           </a:p>
@@ -5434,7 +5434,7 @@
           <a:p>
             <a:fld id="{234E9D8B-2912-4C2C-9937-BDF19994C8BD}" type="datetime1">
               <a:rPr lang="fr-FR" smtClean="0"/>
-              <a:t>10/01/2023</a:t>
+              <a:t>11/01/2023</a:t>
             </a:fld>
             <a:endParaRPr lang="fr-CH" dirty="0"/>
           </a:p>
@@ -5666,7 +5666,7 @@
           <a:p>
             <a:fld id="{3B204245-6F36-4F68-BED5-BEF93D6CD5A3}" type="datetime1">
               <a:rPr lang="fr-FR" smtClean="0"/>
-              <a:t>10/01/2023</a:t>
+              <a:t>11/01/2023</a:t>
             </a:fld>
             <a:endParaRPr lang="fr-CH" dirty="0"/>
           </a:p>
@@ -6033,7 +6033,7 @@
           <a:p>
             <a:fld id="{7344E52A-3AAD-45F5-85C3-7E411A8CF8B4}" type="datetime1">
               <a:rPr lang="fr-FR" smtClean="0"/>
-              <a:t>10/01/2023</a:t>
+              <a:t>11/01/2023</a:t>
             </a:fld>
             <a:endParaRPr lang="fr-CH" dirty="0"/>
           </a:p>
@@ -6151,7 +6151,7 @@
           <a:p>
             <a:fld id="{3AA6E406-6F7E-4F47-A92A-06E6E7480257}" type="datetime1">
               <a:rPr lang="fr-FR" smtClean="0"/>
-              <a:t>10/01/2023</a:t>
+              <a:t>11/01/2023</a:t>
             </a:fld>
             <a:endParaRPr lang="fr-CH" dirty="0"/>
           </a:p>
@@ -6337,7 +6337,7 @@
           <a:p>
             <a:fld id="{38A07EE0-E6AB-4D7C-8184-74ECC320894F}" type="datetime1">
               <a:rPr lang="fr-FR" smtClean="0"/>
-              <a:t>10/01/2023</a:t>
+              <a:t>11/01/2023</a:t>
             </a:fld>
             <a:endParaRPr dirty="0"/>
           </a:p>
@@ -6444,7 +6444,7 @@
           <a:p>
             <a:fld id="{A2040E95-4D7E-464F-93C7-04607A41C63D}" type="datetime1">
               <a:rPr lang="fr-FR" smtClean="0"/>
-              <a:t>10/01/2023</a:t>
+              <a:t>11/01/2023</a:t>
             </a:fld>
             <a:endParaRPr lang="fr-CH" dirty="0"/>
           </a:p>
@@ -6721,7 +6721,7 @@
           <a:p>
             <a:fld id="{6D4EB2F7-F21D-437C-A893-2E66930CFE3E}" type="datetime1">
               <a:rPr lang="fr-FR" smtClean="0"/>
-              <a:t>10/01/2023</a:t>
+              <a:t>11/01/2023</a:t>
             </a:fld>
             <a:endParaRPr lang="fr-CH" dirty="0"/>
           </a:p>
@@ -6974,7 +6974,7 @@
           <a:p>
             <a:fld id="{3C1FD952-4848-44C8-96F3-C11EF32F09B5}" type="datetime1">
               <a:rPr lang="fr-FR" smtClean="0"/>
-              <a:t>10/01/2023</a:t>
+              <a:t>11/01/2023</a:t>
             </a:fld>
             <a:endParaRPr lang="fr-CH" dirty="0"/>
           </a:p>
@@ -7144,7 +7144,7 @@
           <a:p>
             <a:fld id="{CECE216C-7737-4305-B590-D60D4FCA22A1}" type="datetime1">
               <a:rPr lang="fr-FR" smtClean="0"/>
-              <a:t>10/01/2023</a:t>
+              <a:t>11/01/2023</a:t>
             </a:fld>
             <a:endParaRPr lang="fr-CH" dirty="0"/>
           </a:p>
@@ -7324,7 +7324,7 @@
           <a:p>
             <a:fld id="{42857C72-D9C6-4DDF-957E-53C3C72A2300}" type="datetime1">
               <a:rPr lang="fr-FR" smtClean="0"/>
-              <a:t>10/01/2023</a:t>
+              <a:t>11/01/2023</a:t>
             </a:fld>
             <a:endParaRPr lang="fr-CH" dirty="0"/>
           </a:p>
@@ -7575,7 +7575,7 @@
           <a:p>
             <a:fld id="{39AFF5C3-38F0-4A48-AA5E-78F81B9EC9B3}" type="datetime1">
               <a:rPr lang="fr-FR" smtClean="0"/>
-              <a:t>10/01/2023</a:t>
+              <a:t>11/01/2023</a:t>
             </a:fld>
             <a:endParaRPr dirty="0"/>
           </a:p>
@@ -7876,7 +7876,7 @@
           <a:p>
             <a:fld id="{2502B530-AC39-4A0D-952A-8F3B7EC9C60E}" type="datetime1">
               <a:rPr lang="fr-FR" smtClean="0"/>
-              <a:t>10/01/2023</a:t>
+              <a:t>11/01/2023</a:t>
             </a:fld>
             <a:endParaRPr dirty="0"/>
           </a:p>
@@ -8325,7 +8325,7 @@
           <a:p>
             <a:fld id="{8F795D86-F846-4EFA-9511-3B6F1560418E}" type="datetime1">
               <a:rPr lang="fr-FR" smtClean="0"/>
-              <a:t>10/01/2023</a:t>
+              <a:t>11/01/2023</a:t>
             </a:fld>
             <a:endParaRPr dirty="0"/>
           </a:p>
@@ -8464,7 +8464,7 @@
           <a:p>
             <a:fld id="{6929C859-EAB0-4DD7-92F1-2AA6FD52EC4F}" type="datetime1">
               <a:rPr lang="fr-FR" smtClean="0"/>
-              <a:t>10/01/2023</a:t>
+              <a:t>11/01/2023</a:t>
             </a:fld>
             <a:endParaRPr dirty="0"/>
           </a:p>
@@ -8571,7 +8571,7 @@
           <a:p>
             <a:fld id="{0FA372CC-B7CA-4F20-B855-E48DF34FC9E3}" type="datetime1">
               <a:rPr lang="fr-FR" smtClean="0"/>
-              <a:t>10/01/2023</a:t>
+              <a:t>11/01/2023</a:t>
             </a:fld>
             <a:endParaRPr dirty="0"/>
           </a:p>
@@ -8869,7 +8869,7 @@
           <a:p>
             <a:fld id="{13B2C07D-2D1B-4307-BAC8-7F6069D970D9}" type="datetime1">
               <a:rPr lang="fr-FR" smtClean="0"/>
-              <a:t>10/01/2023</a:t>
+              <a:t>11/01/2023</a:t>
             </a:fld>
             <a:endParaRPr dirty="0"/>
           </a:p>
@@ -9095,7 +9095,7 @@
           <a:p>
             <a:fld id="{6D026B3A-09A0-4CBE-9E60-89A1E90FE477}" type="datetime1">
               <a:rPr lang="fr-FR" smtClean="0"/>
-              <a:t>10/01/2023</a:t>
+              <a:t>11/01/2023</a:t>
             </a:fld>
             <a:endParaRPr dirty="0"/>
           </a:p>
@@ -9664,7 +9664,7 @@
           <a:p>
             <a:fld id="{D9AD19A3-599F-4176-8EFA-B93B9C32C729}" type="datetime1">
               <a:rPr lang="fr-FR" smtClean="0"/>
-              <a:t>10/01/2023</a:t>
+              <a:t>11/01/2023</a:t>
             </a:fld>
             <a:endParaRPr lang="fr-CH" dirty="0"/>
           </a:p>
@@ -10208,7 +10208,7 @@
           <a:p>
             <a:fld id="{CA7F9AFC-2EF8-4A3C-BE18-543FC9B65096}" type="datetime1">
               <a:rPr lang="fr-FR" smtClean="0"/>
-              <a:t>10/01/2023</a:t>
+              <a:t>11/01/2023</a:t>
             </a:fld>
             <a:endParaRPr lang="fr-CH" dirty="0"/>
           </a:p>
@@ -14369,12 +14369,193 @@
           </a:p>
         </p:txBody>
       </p:sp>
+      <p:sp>
+        <p:nvSpPr>
+          <p:cNvPr id="8" name="ZoneTexte 7">
+            <a:extLst>
+              <a:ext uri="{FF2B5EF4-FFF2-40B4-BE49-F238E27FC236}">
+                <a16:creationId xmlns:a16="http://schemas.microsoft.com/office/drawing/2014/main" id="{033C9D50-5DD1-10D3-ED4E-349C3331ECD3}"/>
+              </a:ext>
+            </a:extLst>
+          </p:cNvPr>
+          <p:cNvSpPr txBox="1"/>
+          <p:nvPr/>
+        </p:nvSpPr>
+        <p:spPr>
+          <a:xfrm>
+            <a:off x="3709147" y="5157468"/>
+            <a:ext cx="3042338" cy="1295868"/>
+          </a:xfrm>
+          <a:prstGeom prst="rect">
+            <a:avLst/>
+          </a:prstGeom>
+          <a:noFill/>
+        </p:spPr>
+        <p:txBody>
+          <a:bodyPr wrap="square" rtlCol="0">
+            <a:spAutoFit/>
+          </a:bodyPr>
+          <a:lstStyle/>
+          <a:p>
+            <a:pPr marL="457200" indent="-457200">
+              <a:lnSpc>
+                <a:spcPct val="150000"/>
+              </a:lnSpc>
+              <a:buClr>
+                <a:srgbClr val="002060"/>
+              </a:buClr>
+              <a:buFont typeface="Wingdings" panose="05000000000000000000" pitchFamily="2" charset="2"/>
+              <a:buChar char="§"/>
+            </a:pPr>
+            <a:r>
+              <a:rPr lang="fr-CH" dirty="0">
+                <a:latin typeface="Calibri" panose="020F0502020204030204" pitchFamily="34" charset="0"/>
+                <a:cs typeface="Calibri" panose="020F0502020204030204" pitchFamily="34" charset="0"/>
+              </a:rPr>
+              <a:t>AWS IoT </a:t>
+            </a:r>
+            <a:r>
+              <a:rPr lang="fr-CH" dirty="0" err="1">
+                <a:latin typeface="Calibri" panose="020F0502020204030204" pitchFamily="34" charset="0"/>
+                <a:cs typeface="Calibri" panose="020F0502020204030204" pitchFamily="34" charset="0"/>
+              </a:rPr>
+              <a:t>Core</a:t>
+            </a:r>
+            <a:endParaRPr lang="fr-CH" dirty="0">
+              <a:latin typeface="Calibri" panose="020F0502020204030204" pitchFamily="34" charset="0"/>
+              <a:cs typeface="Calibri" panose="020F0502020204030204" pitchFamily="34" charset="0"/>
+            </a:endParaRPr>
+          </a:p>
+          <a:p>
+            <a:pPr marL="457200" indent="-457200">
+              <a:lnSpc>
+                <a:spcPct val="150000"/>
+              </a:lnSpc>
+              <a:buClr>
+                <a:srgbClr val="002060"/>
+              </a:buClr>
+              <a:buFont typeface="Wingdings" panose="05000000000000000000" pitchFamily="2" charset="2"/>
+              <a:buChar char="§"/>
+            </a:pPr>
+            <a:r>
+              <a:rPr lang="fr-CH" dirty="0">
+                <a:latin typeface="Calibri" panose="020F0502020204030204" pitchFamily="34" charset="0"/>
+                <a:cs typeface="Calibri" panose="020F0502020204030204" pitchFamily="34" charset="0"/>
+              </a:rPr>
+              <a:t>AWS Lambda</a:t>
+            </a:r>
+          </a:p>
+          <a:p>
+            <a:pPr>
+              <a:lnSpc>
+                <a:spcPct val="150000"/>
+              </a:lnSpc>
+              <a:buClr>
+                <a:srgbClr val="002060"/>
+              </a:buClr>
+            </a:pPr>
+            <a:endParaRPr lang="fr-CH" dirty="0">
+              <a:latin typeface="Calibri" panose="020F0502020204030204" pitchFamily="34" charset="0"/>
+              <a:cs typeface="Calibri" panose="020F0502020204030204" pitchFamily="34" charset="0"/>
+            </a:endParaRPr>
+          </a:p>
+        </p:txBody>
+      </p:sp>
+      <p:sp>
+        <p:nvSpPr>
+          <p:cNvPr id="11" name="ZoneTexte 10">
+            <a:extLst>
+              <a:ext uri="{FF2B5EF4-FFF2-40B4-BE49-F238E27FC236}">
+                <a16:creationId xmlns:a16="http://schemas.microsoft.com/office/drawing/2014/main" id="{81377319-714C-E917-3FCC-900A1E8A2E11}"/>
+              </a:ext>
+            </a:extLst>
+          </p:cNvPr>
+          <p:cNvSpPr txBox="1"/>
+          <p:nvPr/>
+        </p:nvSpPr>
+        <p:spPr>
+          <a:xfrm>
+            <a:off x="7929918" y="5157468"/>
+            <a:ext cx="3042338" cy="1295868"/>
+          </a:xfrm>
+          <a:prstGeom prst="rect">
+            <a:avLst/>
+          </a:prstGeom>
+          <a:noFill/>
+        </p:spPr>
+        <p:txBody>
+          <a:bodyPr wrap="square" rtlCol="0">
+            <a:spAutoFit/>
+          </a:bodyPr>
+          <a:lstStyle/>
+          <a:p>
+            <a:pPr marL="457200" indent="-457200">
+              <a:lnSpc>
+                <a:spcPct val="150000"/>
+              </a:lnSpc>
+              <a:buClr>
+                <a:srgbClr val="002060"/>
+              </a:buClr>
+              <a:buFont typeface="Wingdings" panose="05000000000000000000" pitchFamily="2" charset="2"/>
+              <a:buChar char="§"/>
+            </a:pPr>
+            <a:r>
+              <a:rPr lang="fr-CH" dirty="0" err="1">
+                <a:latin typeface="Calibri" panose="020F0502020204030204" pitchFamily="34" charset="0"/>
+                <a:cs typeface="Calibri" panose="020F0502020204030204" pitchFamily="34" charset="0"/>
+              </a:rPr>
+              <a:t>InfluxDB</a:t>
+            </a:r>
+            <a:endParaRPr lang="fr-CH" dirty="0">
+              <a:latin typeface="Calibri" panose="020F0502020204030204" pitchFamily="34" charset="0"/>
+              <a:cs typeface="Calibri" panose="020F0502020204030204" pitchFamily="34" charset="0"/>
+            </a:endParaRPr>
+          </a:p>
+          <a:p>
+            <a:pPr marL="457200" indent="-457200">
+              <a:lnSpc>
+                <a:spcPct val="150000"/>
+              </a:lnSpc>
+              <a:buClr>
+                <a:srgbClr val="002060"/>
+              </a:buClr>
+              <a:buFont typeface="Wingdings" panose="05000000000000000000" pitchFamily="2" charset="2"/>
+              <a:buChar char="§"/>
+            </a:pPr>
+            <a:r>
+              <a:rPr lang="fr-CH" dirty="0" err="1">
+                <a:latin typeface="Calibri" panose="020F0502020204030204" pitchFamily="34" charset="0"/>
+                <a:cs typeface="Calibri" panose="020F0502020204030204" pitchFamily="34" charset="0"/>
+              </a:rPr>
+              <a:t>Grafana</a:t>
+            </a:r>
+            <a:endParaRPr lang="fr-CH" dirty="0">
+              <a:latin typeface="Calibri" panose="020F0502020204030204" pitchFamily="34" charset="0"/>
+              <a:cs typeface="Calibri" panose="020F0502020204030204" pitchFamily="34" charset="0"/>
+            </a:endParaRPr>
+          </a:p>
+          <a:p>
+            <a:pPr>
+              <a:lnSpc>
+                <a:spcPct val="150000"/>
+              </a:lnSpc>
+              <a:buClr>
+                <a:srgbClr val="002060"/>
+              </a:buClr>
+            </a:pPr>
+            <a:endParaRPr lang="fr-CH" dirty="0">
+              <a:latin typeface="Calibri" panose="020F0502020204030204" pitchFamily="34" charset="0"/>
+              <a:cs typeface="Calibri" panose="020F0502020204030204" pitchFamily="34" charset="0"/>
+            </a:endParaRPr>
+          </a:p>
+        </p:txBody>
+      </p:sp>
       <p:pic>
         <p:nvPicPr>
-          <p:cNvPr id="6" name="Image 5">
+          <p:cNvPr id="5" name="Image 4">
             <a:extLst>
               <a:ext uri="{FF2B5EF4-FFF2-40B4-BE49-F238E27FC236}">
-                <a16:creationId xmlns:a16="http://schemas.microsoft.com/office/drawing/2014/main" id="{38D7E985-94F9-170C-50F3-476291D4E8B3}"/>
+                <a16:creationId xmlns:a16="http://schemas.microsoft.com/office/drawing/2014/main" id="{9BF06A94-9D33-1461-05B6-43AC3710CF3A}"/>
               </a:ext>
             </a:extLst>
           </p:cNvPr>
@@ -14391,195 +14572,14 @@
         </p:blipFill>
         <p:spPr>
           <a:xfrm>
-            <a:off x="215214" y="1772816"/>
-            <a:ext cx="11758395" cy="2698822"/>
+            <a:off x="310901" y="1961915"/>
+            <a:ext cx="11567021" cy="2654897"/>
           </a:xfrm>
           <a:prstGeom prst="rect">
             <a:avLst/>
           </a:prstGeom>
         </p:spPr>
       </p:pic>
-      <p:sp>
-        <p:nvSpPr>
-          <p:cNvPr id="8" name="ZoneTexte 7">
-            <a:extLst>
-              <a:ext uri="{FF2B5EF4-FFF2-40B4-BE49-F238E27FC236}">
-                <a16:creationId xmlns:a16="http://schemas.microsoft.com/office/drawing/2014/main" id="{033C9D50-5DD1-10D3-ED4E-349C3331ECD3}"/>
-              </a:ext>
-            </a:extLst>
-          </p:cNvPr>
-          <p:cNvSpPr txBox="1"/>
-          <p:nvPr/>
-        </p:nvSpPr>
-        <p:spPr>
-          <a:xfrm>
-            <a:off x="3709147" y="5157468"/>
-            <a:ext cx="3042338" cy="1295868"/>
-          </a:xfrm>
-          <a:prstGeom prst="rect">
-            <a:avLst/>
-          </a:prstGeom>
-          <a:noFill/>
-        </p:spPr>
-        <p:txBody>
-          <a:bodyPr wrap="square" rtlCol="0">
-            <a:spAutoFit/>
-          </a:bodyPr>
-          <a:lstStyle/>
-          <a:p>
-            <a:pPr marL="457200" indent="-457200">
-              <a:lnSpc>
-                <a:spcPct val="150000"/>
-              </a:lnSpc>
-              <a:buClr>
-                <a:srgbClr val="002060"/>
-              </a:buClr>
-              <a:buFont typeface="Wingdings" panose="05000000000000000000" pitchFamily="2" charset="2"/>
-              <a:buChar char="§"/>
-            </a:pPr>
-            <a:r>
-              <a:rPr lang="fr-CH" dirty="0">
-                <a:latin typeface="Calibri" panose="020F0502020204030204" pitchFamily="34" charset="0"/>
-                <a:cs typeface="Calibri" panose="020F0502020204030204" pitchFamily="34" charset="0"/>
-              </a:rPr>
-              <a:t>AWS IoT </a:t>
-            </a:r>
-            <a:r>
-              <a:rPr lang="fr-CH" dirty="0" err="1">
-                <a:latin typeface="Calibri" panose="020F0502020204030204" pitchFamily="34" charset="0"/>
-                <a:cs typeface="Calibri" panose="020F0502020204030204" pitchFamily="34" charset="0"/>
-              </a:rPr>
-              <a:t>Core</a:t>
-            </a:r>
-            <a:endParaRPr lang="fr-CH" dirty="0">
-              <a:latin typeface="Calibri" panose="020F0502020204030204" pitchFamily="34" charset="0"/>
-              <a:cs typeface="Calibri" panose="020F0502020204030204" pitchFamily="34" charset="0"/>
-            </a:endParaRPr>
-          </a:p>
-          <a:p>
-            <a:pPr marL="457200" indent="-457200">
-              <a:lnSpc>
-                <a:spcPct val="150000"/>
-              </a:lnSpc>
-              <a:buClr>
-                <a:srgbClr val="002060"/>
-              </a:buClr>
-              <a:buFont typeface="Wingdings" panose="05000000000000000000" pitchFamily="2" charset="2"/>
-              <a:buChar char="§"/>
-            </a:pPr>
-            <a:r>
-              <a:rPr lang="fr-CH" dirty="0">
-                <a:latin typeface="Calibri" panose="020F0502020204030204" pitchFamily="34" charset="0"/>
-                <a:cs typeface="Calibri" panose="020F0502020204030204" pitchFamily="34" charset="0"/>
-              </a:rPr>
-              <a:t>AWS Lambda</a:t>
-            </a:r>
-          </a:p>
-          <a:p>
-            <a:pPr>
-              <a:lnSpc>
-                <a:spcPct val="150000"/>
-              </a:lnSpc>
-              <a:buClr>
-                <a:srgbClr val="002060"/>
-              </a:buClr>
-            </a:pPr>
-            <a:endParaRPr lang="fr-CH" dirty="0">
-              <a:latin typeface="Calibri" panose="020F0502020204030204" pitchFamily="34" charset="0"/>
-              <a:cs typeface="Calibri" panose="020F0502020204030204" pitchFamily="34" charset="0"/>
-            </a:endParaRPr>
-          </a:p>
-        </p:txBody>
-      </p:sp>
-      <p:sp>
-        <p:nvSpPr>
-          <p:cNvPr id="11" name="ZoneTexte 10">
-            <a:extLst>
-              <a:ext uri="{FF2B5EF4-FFF2-40B4-BE49-F238E27FC236}">
-                <a16:creationId xmlns:a16="http://schemas.microsoft.com/office/drawing/2014/main" id="{81377319-714C-E917-3FCC-900A1E8A2E11}"/>
-              </a:ext>
-            </a:extLst>
-          </p:cNvPr>
-          <p:cNvSpPr txBox="1"/>
-          <p:nvPr/>
-        </p:nvSpPr>
-        <p:spPr>
-          <a:xfrm>
-            <a:off x="7929918" y="5157468"/>
-            <a:ext cx="3042338" cy="1295868"/>
-          </a:xfrm>
-          <a:prstGeom prst="rect">
-            <a:avLst/>
-          </a:prstGeom>
-          <a:noFill/>
-        </p:spPr>
-        <p:txBody>
-          <a:bodyPr wrap="square" rtlCol="0">
-            <a:spAutoFit/>
-          </a:bodyPr>
-          <a:lstStyle/>
-          <a:p>
-            <a:pPr marL="457200" indent="-457200">
-              <a:lnSpc>
-                <a:spcPct val="150000"/>
-              </a:lnSpc>
-              <a:buClr>
-                <a:srgbClr val="002060"/>
-              </a:buClr>
-              <a:buFont typeface="Wingdings" panose="05000000000000000000" pitchFamily="2" charset="2"/>
-              <a:buChar char="§"/>
-            </a:pPr>
-            <a:r>
-              <a:rPr lang="fr-CH" dirty="0" err="1">
-                <a:latin typeface="Calibri" panose="020F0502020204030204" pitchFamily="34" charset="0"/>
-                <a:cs typeface="Calibri" panose="020F0502020204030204" pitchFamily="34" charset="0"/>
-              </a:rPr>
-              <a:t>InfluxDB</a:t>
-            </a:r>
-            <a:endParaRPr lang="fr-CH" dirty="0">
-              <a:latin typeface="Calibri" panose="020F0502020204030204" pitchFamily="34" charset="0"/>
-              <a:cs typeface="Calibri" panose="020F0502020204030204" pitchFamily="34" charset="0"/>
-            </a:endParaRPr>
-          </a:p>
-          <a:p>
-            <a:pPr marL="457200" indent="-457200">
-              <a:lnSpc>
-                <a:spcPct val="150000"/>
-              </a:lnSpc>
-              <a:buClr>
-                <a:srgbClr val="002060"/>
-              </a:buClr>
-              <a:buFont typeface="Wingdings" panose="05000000000000000000" pitchFamily="2" charset="2"/>
-              <a:buChar char="§"/>
-            </a:pPr>
-            <a:r>
-              <a:rPr lang="fr-CH" dirty="0" err="1">
-                <a:latin typeface="Calibri" panose="020F0502020204030204" pitchFamily="34" charset="0"/>
-                <a:cs typeface="Calibri" panose="020F0502020204030204" pitchFamily="34" charset="0"/>
-              </a:rPr>
-              <a:t>Grafana</a:t>
-            </a:r>
-            <a:endParaRPr lang="fr-CH" dirty="0">
-              <a:latin typeface="Calibri" panose="020F0502020204030204" pitchFamily="34" charset="0"/>
-              <a:cs typeface="Calibri" panose="020F0502020204030204" pitchFamily="34" charset="0"/>
-            </a:endParaRPr>
-          </a:p>
-          <a:p>
-            <a:pPr>
-              <a:lnSpc>
-                <a:spcPct val="150000"/>
-              </a:lnSpc>
-              <a:buClr>
-                <a:srgbClr val="002060"/>
-              </a:buClr>
-            </a:pPr>
-            <a:endParaRPr lang="fr-CH" dirty="0">
-              <a:latin typeface="Calibri" panose="020F0502020204030204" pitchFamily="34" charset="0"/>
-              <a:cs typeface="Calibri" panose="020F0502020204030204" pitchFamily="34" charset="0"/>
-            </a:endParaRPr>
-          </a:p>
-        </p:txBody>
-      </p:sp>
     </p:spTree>
     <p:extLst>
       <p:ext uri="{BB962C8B-B14F-4D97-AF65-F5344CB8AC3E}">

</xml_diff>